<commit_message>
Fix remark after presentation.
</commit_message>
<xml_diff>
--- a/Эффективная реализация сопрограмм в управляемой среде.pptx
+++ b/Эффективная реализация сопрограмм в управляемой среде.pptx
@@ -13,6 +13,9 @@
     <p:sldId id="263" r:id="rId7"/>
     <p:sldId id="261" r:id="rId8"/>
     <p:sldId id="262" r:id="rId9"/>
+    <p:sldId id="264" r:id="rId10"/>
+    <p:sldId id="266" r:id="rId11"/>
+    <p:sldId id="265" r:id="rId12"/>
   </p:sldIdLst>
   <p:sldSz cx="12192000" cy="6858000"/>
   <p:notesSz cx="6858000" cy="9144000"/>
@@ -3084,6 +3087,240 @@
 </p:sld>
 </file>
 
+<file path=ppt/slides/slide10.xml><?xml version="1.0" encoding="utf-8"?>
+<p:sld xmlns:a="http://schemas.openxmlformats.org/drawingml/2006/main" xmlns:r="http://schemas.openxmlformats.org/officeDocument/2006/relationships" xmlns:p="http://schemas.openxmlformats.org/presentationml/2006/main">
+  <p:cSld>
+    <p:spTree>
+      <p:nvGrpSpPr>
+        <p:cNvPr id="1" name=""/>
+        <p:cNvGrpSpPr/>
+        <p:nvPr/>
+      </p:nvGrpSpPr>
+      <p:grpSpPr>
+        <a:xfrm>
+          <a:off x="0" y="0"/>
+          <a:ext cx="0" cy="0"/>
+          <a:chOff x="0" y="0"/>
+          <a:chExt cx="0" cy="0"/>
+        </a:xfrm>
+      </p:grpSpPr>
+      <p:sp>
+        <p:nvSpPr>
+          <p:cNvPr id="2" name="Заголовок 1"/>
+          <p:cNvSpPr>
+            <a:spLocks noGrp="1"/>
+          </p:cNvSpPr>
+          <p:nvPr>
+            <p:ph type="title"/>
+          </p:nvPr>
+        </p:nvSpPr>
+        <p:spPr/>
+        <p:txBody>
+          <a:bodyPr/>
+          <a:lstStyle/>
+          <a:p>
+            <a:endParaRPr lang="ru-RU"/>
+          </a:p>
+        </p:txBody>
+      </p:sp>
+      <p:sp>
+        <p:nvSpPr>
+          <p:cNvPr id="3" name="Объект 2"/>
+          <p:cNvSpPr>
+            <a:spLocks noGrp="1"/>
+          </p:cNvSpPr>
+          <p:nvPr>
+            <p:ph idx="1"/>
+          </p:nvPr>
+        </p:nvSpPr>
+        <p:spPr/>
+        <p:txBody>
+          <a:bodyPr/>
+          <a:lstStyle/>
+          <a:p>
+            <a:endParaRPr lang="ru-RU"/>
+          </a:p>
+        </p:txBody>
+      </p:sp>
+    </p:spTree>
+    <p:extLst>
+      <p:ext uri="{BB962C8B-B14F-4D97-AF65-F5344CB8AC3E}">
+        <p14:creationId xmlns:p14="http://schemas.microsoft.com/office/powerpoint/2010/main" val="2920003080"/>
+      </p:ext>
+    </p:extLst>
+  </p:cSld>
+  <p:clrMapOvr>
+    <a:masterClrMapping/>
+  </p:clrMapOvr>
+</p:sld>
+</file>
+
+<file path=ppt/slides/slide11.xml><?xml version="1.0" encoding="utf-8"?>
+<p:sld xmlns:a="http://schemas.openxmlformats.org/drawingml/2006/main" xmlns:r="http://schemas.openxmlformats.org/officeDocument/2006/relationships" xmlns:p="http://schemas.openxmlformats.org/presentationml/2006/main">
+  <p:cSld>
+    <p:spTree>
+      <p:nvGrpSpPr>
+        <p:cNvPr id="1" name=""/>
+        <p:cNvGrpSpPr/>
+        <p:nvPr/>
+      </p:nvGrpSpPr>
+      <p:grpSpPr>
+        <a:xfrm>
+          <a:off x="0" y="0"/>
+          <a:ext cx="0" cy="0"/>
+          <a:chOff x="0" y="0"/>
+          <a:chExt cx="0" cy="0"/>
+        </a:xfrm>
+      </p:grpSpPr>
+      <p:sp>
+        <p:nvSpPr>
+          <p:cNvPr id="2" name="Заголовок 1"/>
+          <p:cNvSpPr>
+            <a:spLocks noGrp="1"/>
+          </p:cNvSpPr>
+          <p:nvPr>
+            <p:ph type="title"/>
+          </p:nvPr>
+        </p:nvSpPr>
+        <p:spPr/>
+        <p:txBody>
+          <a:bodyPr>
+            <a:normAutofit/>
+          </a:bodyPr>
+          <a:lstStyle/>
+          <a:p>
+            <a:pPr algn="ctr"/>
+            <a:r>
+              <a:rPr lang="ru-RU" sz="6000" dirty="0" smtClean="0"/>
+              <a:t>Отличие от «</a:t>
+            </a:r>
+            <a:r>
+              <a:rPr lang="en-US" sz="6000" dirty="0" smtClean="0"/>
+              <a:t>Project </a:t>
+            </a:r>
+            <a:r>
+              <a:rPr lang="en-US" sz="6000" dirty="0"/>
+              <a:t>L</a:t>
+            </a:r>
+            <a:r>
+              <a:rPr lang="en-US" sz="6000" dirty="0" smtClean="0"/>
+              <a:t>oom</a:t>
+            </a:r>
+            <a:r>
+              <a:rPr lang="ru-RU" sz="6000" dirty="0" smtClean="0"/>
+              <a:t>»</a:t>
+            </a:r>
+            <a:endParaRPr lang="ru-RU" sz="6000" dirty="0"/>
+          </a:p>
+        </p:txBody>
+      </p:sp>
+      <p:sp>
+        <p:nvSpPr>
+          <p:cNvPr id="3" name="Объект 2"/>
+          <p:cNvSpPr>
+            <a:spLocks noGrp="1"/>
+          </p:cNvSpPr>
+          <p:nvPr>
+            <p:ph idx="1"/>
+          </p:nvPr>
+        </p:nvSpPr>
+        <p:spPr/>
+        <p:txBody>
+          <a:bodyPr>
+            <a:normAutofit/>
+          </a:bodyPr>
+          <a:lstStyle/>
+          <a:p>
+            <a:pPr marL="0" indent="0">
+              <a:buNone/>
+            </a:pPr>
+            <a:r>
+              <a:rPr lang="ru-RU" sz="4400" dirty="0" smtClean="0"/>
+              <a:t>В требованиях: сохранить оптимизации.</a:t>
+            </a:r>
+            <a:endParaRPr lang="en-US" sz="4400" dirty="0" smtClean="0"/>
+          </a:p>
+          <a:p>
+            <a:pPr marL="0" indent="0">
+              <a:buNone/>
+            </a:pPr>
+            <a:endParaRPr lang="ru-RU" sz="4400" dirty="0" smtClean="0"/>
+          </a:p>
+          <a:p>
+            <a:pPr marL="0" indent="0" algn="ctr">
+              <a:buNone/>
+            </a:pPr>
+            <a:r>
+              <a:rPr lang="ru-RU" sz="4000" dirty="0" smtClean="0"/>
+              <a:t>В «</a:t>
+            </a:r>
+            <a:r>
+              <a:rPr lang="en-US" sz="4000" dirty="0" smtClean="0"/>
+              <a:t>Loom</a:t>
+            </a:r>
+            <a:r>
+              <a:rPr lang="ru-RU" sz="4000" dirty="0" smtClean="0"/>
+              <a:t>» не работает оптимизация «</a:t>
+            </a:r>
+            <a:r>
+              <a:rPr lang="en-US" sz="4000" dirty="0" smtClean="0"/>
+              <a:t>biased locking</a:t>
+            </a:r>
+            <a:r>
+              <a:rPr lang="ru-RU" sz="4000" dirty="0" smtClean="0"/>
+              <a:t>»</a:t>
+            </a:r>
+            <a:r>
+              <a:rPr lang="en-US" sz="4000" dirty="0"/>
+              <a:t>.</a:t>
+            </a:r>
+            <a:endParaRPr lang="ru-RU" sz="4000" dirty="0"/>
+          </a:p>
+        </p:txBody>
+      </p:sp>
+      <p:pic>
+        <p:nvPicPr>
+          <p:cNvPr id="4" name="Рисунок 3"/>
+          <p:cNvPicPr>
+            <a:picLocks noChangeAspect="1"/>
+          </p:cNvPicPr>
+          <p:nvPr/>
+        </p:nvPicPr>
+        <p:blipFill>
+          <a:blip r:embed="rId2">
+            <a:extLst>
+              <a:ext uri="{28A0092B-C50C-407E-A947-70E740481C1C}">
+                <a14:useLocalDpi xmlns:a14="http://schemas.microsoft.com/office/drawing/2010/main" val="0"/>
+              </a:ext>
+            </a:extLst>
+          </a:blip>
+          <a:stretch>
+            <a:fillRect/>
+          </a:stretch>
+        </p:blipFill>
+        <p:spPr>
+          <a:xfrm>
+            <a:off x="1975393" y="4267199"/>
+            <a:ext cx="1938506" cy="2342606"/>
+          </a:xfrm>
+          <a:prstGeom prst="rect">
+            <a:avLst/>
+          </a:prstGeom>
+        </p:spPr>
+      </p:pic>
+    </p:spTree>
+    <p:extLst>
+      <p:ext uri="{BB962C8B-B14F-4D97-AF65-F5344CB8AC3E}">
+        <p14:creationId xmlns:p14="http://schemas.microsoft.com/office/powerpoint/2010/main" val="3487577487"/>
+      </p:ext>
+    </p:extLst>
+  </p:cSld>
+  <p:clrMapOvr>
+    <a:masterClrMapping/>
+  </p:clrMapOvr>
+</p:sld>
+</file>
+
 <file path=ppt/slides/slide2.xml><?xml version="1.0" encoding="utf-8"?>
 <p:sld xmlns:a="http://schemas.openxmlformats.org/drawingml/2006/main" xmlns:r="http://schemas.openxmlformats.org/officeDocument/2006/relationships" xmlns:p="http://schemas.openxmlformats.org/presentationml/2006/main">
   <p:cSld>
@@ -3399,7 +3636,7 @@
             </a:r>
             <a:r>
               <a:rPr lang="en-US" sz="4000" dirty="0" err="1"/>
-              <a:t>d</a:t>
+              <a:t>g</a:t>
             </a:r>
             <a:r>
               <a:rPr lang="en-US" sz="4000" dirty="0" smtClean="0"/>
@@ -3996,7 +4233,7 @@
         </p:spPr>
         <p:txBody>
           <a:bodyPr>
-            <a:normAutofit lnSpcReduction="10000"/>
+            <a:normAutofit/>
           </a:bodyPr>
           <a:lstStyle/>
           <a:p>
@@ -4050,12 +4287,16 @@
               <a:t> </a:t>
             </a:r>
             <a:r>
-              <a:rPr lang="en-US" sz="3600" dirty="0" err="1" smtClean="0"/>
-              <a:t>Goland</a:t>
+              <a:rPr lang="en-US" sz="3600" dirty="0" smtClean="0"/>
+              <a:t>Go</a:t>
             </a:r>
             <a:r>
               <a:rPr lang="ru-RU" sz="3600" dirty="0" smtClean="0"/>
-              <a:t> и проекта </a:t>
+              <a:t> </a:t>
+            </a:r>
+            <a:r>
+              <a:rPr lang="ru-RU" sz="3600" dirty="0" smtClean="0"/>
+              <a:t>и проекта </a:t>
             </a:r>
             <a:r>
               <a:rPr lang="en-US" sz="3600" dirty="0" smtClean="0"/>
@@ -4134,6 +4375,10 @@
               <a:rPr lang="ru-RU" sz="5400" dirty="0" smtClean="0"/>
               <a:t>Задачи</a:t>
             </a:r>
+            <a:r>
+              <a:rPr lang="en-US" sz="5400" dirty="0" smtClean="0"/>
+              <a:t>.</a:t>
+            </a:r>
             <a:endParaRPr lang="ru-RU" sz="5400" dirty="0"/>
           </a:p>
         </p:txBody>
@@ -4188,19 +4433,11 @@
             </a:r>
             <a:r>
               <a:rPr lang="en-US" sz="3600" dirty="0" smtClean="0"/>
-              <a:t>Excelsior </a:t>
-            </a:r>
-            <a:r>
-              <a:rPr lang="en-US" sz="3600" dirty="0" smtClean="0"/>
-              <a:t>RVM</a:t>
+              <a:t>Excelsior RVM</a:t>
             </a:r>
             <a:r>
               <a:rPr lang="ru-RU" sz="3600" dirty="0" smtClean="0"/>
-              <a:t> </a:t>
-            </a:r>
-            <a:r>
-              <a:rPr lang="ru-RU" sz="3600" dirty="0" smtClean="0"/>
-              <a:t>с учетом особенностей языка </a:t>
+              <a:t> с учетом особенностей языка </a:t>
             </a:r>
             <a:r>
               <a:rPr lang="en-US" sz="3600" dirty="0" smtClean="0"/>
@@ -4262,6 +4499,99 @@
     <p:extLst>
       <p:ext uri="{BB962C8B-B14F-4D97-AF65-F5344CB8AC3E}">
         <p14:creationId xmlns:p14="http://schemas.microsoft.com/office/powerpoint/2010/main" val="1584581954"/>
+      </p:ext>
+    </p:extLst>
+  </p:cSld>
+  <p:clrMapOvr>
+    <a:masterClrMapping/>
+  </p:clrMapOvr>
+</p:sld>
+</file>
+
+<file path=ppt/slides/slide9.xml><?xml version="1.0" encoding="utf-8"?>
+<p:sld xmlns:a="http://schemas.openxmlformats.org/drawingml/2006/main" xmlns:r="http://schemas.openxmlformats.org/officeDocument/2006/relationships" xmlns:p="http://schemas.openxmlformats.org/presentationml/2006/main">
+  <p:cSld>
+    <p:spTree>
+      <p:nvGrpSpPr>
+        <p:cNvPr id="1" name=""/>
+        <p:cNvGrpSpPr/>
+        <p:nvPr/>
+      </p:nvGrpSpPr>
+      <p:grpSpPr>
+        <a:xfrm>
+          <a:off x="0" y="0"/>
+          <a:ext cx="0" cy="0"/>
+          <a:chOff x="0" y="0"/>
+          <a:chExt cx="0" cy="0"/>
+        </a:xfrm>
+      </p:grpSpPr>
+      <p:sp>
+        <p:nvSpPr>
+          <p:cNvPr id="2" name="Заголовок 1"/>
+          <p:cNvSpPr>
+            <a:spLocks noGrp="1"/>
+          </p:cNvSpPr>
+          <p:nvPr>
+            <p:ph type="title"/>
+          </p:nvPr>
+        </p:nvSpPr>
+        <p:spPr/>
+        <p:txBody>
+          <a:bodyPr>
+            <a:normAutofit fontScale="90000"/>
+          </a:bodyPr>
+          <a:lstStyle/>
+          <a:p>
+            <a:pPr algn="ctr"/>
+            <a:r>
+              <a:rPr lang="ru-RU" sz="8800" dirty="0" smtClean="0"/>
+              <a:t>Спасибо за внимание</a:t>
+            </a:r>
+            <a:r>
+              <a:rPr lang="en-US" sz="8800" dirty="0" smtClean="0"/>
+              <a:t>!</a:t>
+            </a:r>
+            <a:r>
+              <a:rPr lang="ru-RU" sz="8800" dirty="0" smtClean="0"/>
+              <a:t> </a:t>
+            </a:r>
+            <a:endParaRPr lang="ru-RU" sz="8800" dirty="0"/>
+          </a:p>
+        </p:txBody>
+      </p:sp>
+      <p:pic>
+        <p:nvPicPr>
+          <p:cNvPr id="4" name="Объект 3"/>
+          <p:cNvPicPr>
+            <a:picLocks noGrp="1" noChangeAspect="1"/>
+          </p:cNvPicPr>
+          <p:nvPr>
+            <p:ph idx="1"/>
+          </p:nvPr>
+        </p:nvPicPr>
+        <p:blipFill>
+          <a:blip r:embed="rId2">
+            <a:extLst>
+              <a:ext uri="{28A0092B-C50C-407E-A947-70E740481C1C}">
+                <a14:useLocalDpi xmlns:a14="http://schemas.microsoft.com/office/drawing/2010/main" val="0"/>
+              </a:ext>
+            </a:extLst>
+          </a:blip>
+          <a:stretch>
+            <a:fillRect/>
+          </a:stretch>
+        </p:blipFill>
+        <p:spPr>
+          <a:xfrm>
+            <a:off x="4064466" y="2034631"/>
+            <a:ext cx="3906314" cy="4351338"/>
+          </a:xfrm>
+        </p:spPr>
+      </p:pic>
+    </p:spTree>
+    <p:extLst>
+      <p:ext uri="{BB962C8B-B14F-4D97-AF65-F5344CB8AC3E}">
+        <p14:creationId xmlns:p14="http://schemas.microsoft.com/office/powerpoint/2010/main" val="3539420884"/>
       </p:ext>
     </p:extLst>
   </p:cSld>

</xml_diff>